<commit_message>
pptx, extra notes and some development files added
</commit_message>
<xml_diff>
--- a/NewYearTweets.pptx
+++ b/NewYearTweets.pptx
@@ -6,8 +6,8 @@
   </p:sldMasterIdLst>
   <p:sldIdLst>
     <p:sldId id="256" r:id="rId2"/>
-    <p:sldId id="258" r:id="rId3"/>
-    <p:sldId id="261" r:id="rId4"/>
+    <p:sldId id="261" r:id="rId3"/>
+    <p:sldId id="258" r:id="rId4"/>
     <p:sldId id="257" r:id="rId5"/>
     <p:sldId id="259" r:id="rId6"/>
     <p:sldId id="260" r:id="rId7"/>
@@ -3200,14 +3200,12 @@
         </p:nvSpPr>
         <p:spPr/>
         <p:txBody>
-          <a:bodyPr>
-            <a:normAutofit/>
-          </a:bodyPr>
+          <a:bodyPr/>
           <a:lstStyle/>
           <a:p>
             <a:r>
               <a:rPr lang="en-GB" dirty="0" smtClean="0"/>
-              <a:t>Task management</a:t>
+              <a:t>Aim</a:t>
             </a:r>
             <a:endParaRPr lang="en-GB" dirty="0"/>
           </a:p>
@@ -3230,55 +3228,25 @@
           <a:p>
             <a:r>
               <a:rPr lang="en-GB" dirty="0" smtClean="0"/>
-              <a:t>Mike, Victoria and Kathryn</a:t>
-            </a:r>
-          </a:p>
-          <a:p>
-            <a:pPr lvl="1"/>
+              <a:t>Download twitter data using the twitter API</a:t>
+            </a:r>
+          </a:p>
+          <a:p>
+            <a:endParaRPr lang="en-GB" dirty="0" smtClean="0"/>
+          </a:p>
+          <a:p>
             <a:r>
               <a:rPr lang="en-GB" dirty="0" smtClean="0"/>
-              <a:t>Map development</a:t>
-            </a:r>
-          </a:p>
-          <a:p>
-            <a:pPr lvl="1"/>
+              <a:t>Display tweets selected by #2016 as they appeared across the globe</a:t>
+            </a:r>
+          </a:p>
+          <a:p>
+            <a:endParaRPr lang="en-GB" dirty="0" smtClean="0"/>
+          </a:p>
+          <a:p>
             <a:r>
               <a:rPr lang="en-GB" dirty="0" smtClean="0"/>
-              <a:t>Implementation of rotation</a:t>
-            </a:r>
-          </a:p>
-          <a:p>
-            <a:pPr lvl="1"/>
-            <a:r>
-              <a:rPr lang="en-GB" dirty="0" smtClean="0"/>
-              <a:t>Date binning</a:t>
-            </a:r>
-          </a:p>
-          <a:p>
-            <a:r>
-              <a:rPr lang="en-GB" dirty="0" smtClean="0"/>
-              <a:t>Chris, Jenny and James</a:t>
-            </a:r>
-          </a:p>
-          <a:p>
-            <a:pPr lvl="1"/>
-            <a:r>
-              <a:rPr lang="en-GB" dirty="0" smtClean="0"/>
-              <a:t>Data download</a:t>
-            </a:r>
-          </a:p>
-          <a:p>
-            <a:pPr lvl="1"/>
-            <a:r>
-              <a:rPr lang="en-GB" dirty="0" smtClean="0"/>
-              <a:t>Geo and time querying</a:t>
-            </a:r>
-          </a:p>
-          <a:p>
-            <a:pPr lvl="1"/>
-            <a:r>
-              <a:rPr lang="en-GB" dirty="0" smtClean="0"/>
-              <a:t>Data management</a:t>
+              <a:t>Interested in the 31/12/15 – 1/1/16 period</a:t>
             </a:r>
             <a:endParaRPr lang="en-GB" dirty="0"/>
           </a:p>
@@ -3287,7 +3255,7 @@
     </p:spTree>
     <p:extLst>
       <p:ext uri="{BB962C8B-B14F-4D97-AF65-F5344CB8AC3E}">
-        <p14:creationId xmlns:p14="http://schemas.microsoft.com/office/powerpoint/2010/main" val="1802325274"/>
+        <p14:creationId xmlns:p14="http://schemas.microsoft.com/office/powerpoint/2010/main" val="1589653882"/>
       </p:ext>
     </p:extLst>
   </p:cSld>
@@ -3326,12 +3294,14 @@
         </p:nvSpPr>
         <p:spPr/>
         <p:txBody>
-          <a:bodyPr/>
+          <a:bodyPr>
+            <a:normAutofit/>
+          </a:bodyPr>
           <a:lstStyle/>
           <a:p>
             <a:r>
               <a:rPr lang="en-GB" dirty="0" smtClean="0"/>
-              <a:t>Aim</a:t>
+              <a:t>Task management</a:t>
             </a:r>
             <a:endParaRPr lang="en-GB" dirty="0"/>
           </a:p>
@@ -3354,25 +3324,55 @@
           <a:p>
             <a:r>
               <a:rPr lang="en-GB" dirty="0" smtClean="0"/>
-              <a:t>Download twitter data using the twitter API</a:t>
-            </a:r>
-          </a:p>
-          <a:p>
-            <a:endParaRPr lang="en-GB" dirty="0" smtClean="0"/>
-          </a:p>
-          <a:p>
+              <a:t>Mike, Victoria and Kathryn</a:t>
+            </a:r>
+          </a:p>
+          <a:p>
+            <a:pPr lvl="1"/>
             <a:r>
               <a:rPr lang="en-GB" dirty="0" smtClean="0"/>
-              <a:t>Display tweets selected by #2016 as they appeared across the globe</a:t>
-            </a:r>
-          </a:p>
-          <a:p>
-            <a:endParaRPr lang="en-GB" dirty="0" smtClean="0"/>
-          </a:p>
-          <a:p>
+              <a:t>Map development</a:t>
+            </a:r>
+          </a:p>
+          <a:p>
+            <a:pPr lvl="1"/>
             <a:r>
               <a:rPr lang="en-GB" dirty="0" smtClean="0"/>
-              <a:t>Interested in the 31/12/15 – 1/1/16 period</a:t>
+              <a:t>Implementation of rotation</a:t>
+            </a:r>
+          </a:p>
+          <a:p>
+            <a:pPr lvl="1"/>
+            <a:r>
+              <a:rPr lang="en-GB" dirty="0" smtClean="0"/>
+              <a:t>Date binning</a:t>
+            </a:r>
+          </a:p>
+          <a:p>
+            <a:r>
+              <a:rPr lang="en-GB" dirty="0" smtClean="0"/>
+              <a:t>Chris, Jenny and James</a:t>
+            </a:r>
+          </a:p>
+          <a:p>
+            <a:pPr lvl="1"/>
+            <a:r>
+              <a:rPr lang="en-GB" dirty="0" smtClean="0"/>
+              <a:t>Data download</a:t>
+            </a:r>
+          </a:p>
+          <a:p>
+            <a:pPr lvl="1"/>
+            <a:r>
+              <a:rPr lang="en-GB" dirty="0" smtClean="0"/>
+              <a:t>Geo and time querying</a:t>
+            </a:r>
+          </a:p>
+          <a:p>
+            <a:pPr lvl="1"/>
+            <a:r>
+              <a:rPr lang="en-GB" dirty="0" smtClean="0"/>
+              <a:t>Data management</a:t>
             </a:r>
             <a:endParaRPr lang="en-GB" dirty="0"/>
           </a:p>
@@ -3381,7 +3381,7 @@
     </p:spTree>
     <p:extLst>
       <p:ext uri="{BB962C8B-B14F-4D97-AF65-F5344CB8AC3E}">
-        <p14:creationId xmlns:p14="http://schemas.microsoft.com/office/powerpoint/2010/main" val="1589653882"/>
+        <p14:creationId xmlns:p14="http://schemas.microsoft.com/office/powerpoint/2010/main" val="1802325274"/>
       </p:ext>
     </p:extLst>
   </p:cSld>

</xml_diff>